<commit_message>
Last correction of Ch04 pictures
</commit_message>
<xml_diff>
--- a/04-CrMagOpt/Pictures/FullPLEv2.pptx
+++ b/04-CrMagOpt/Pictures/FullPLEv2.pptx
@@ -7,7 +7,7 @@
   <p:sldIdLst>
     <p:sldId id="256" r:id="rId2"/>
   </p:sldIdLst>
-  <p:sldSz cx="11522075" cy="12061825"/>
+  <p:sldSz cx="11522075" cy="12422188"/>
   <p:notesSz cx="6858000" cy="9144000"/>
   <p:defaultTextStyle>
     <a:defPPr>
@@ -136,8 +136,8 @@
         </p:nvSpPr>
         <p:spPr>
           <a:xfrm>
-            <a:off x="864159" y="3746985"/>
-            <a:ext cx="9793764" cy="2585474"/>
+            <a:off x="864159" y="3858931"/>
+            <a:ext cx="9793764" cy="2662718"/>
           </a:xfrm>
         </p:spPr>
         <p:txBody>
@@ -164,8 +164,8 @@
         </p:nvSpPr>
         <p:spPr>
           <a:xfrm>
-            <a:off x="1728316" y="6835036"/>
-            <a:ext cx="8065452" cy="3082465"/>
+            <a:off x="1728316" y="7039242"/>
+            <a:ext cx="8065452" cy="3174558"/>
           </a:xfrm>
         </p:spPr>
         <p:txBody>
@@ -548,8 +548,8 @@
         </p:nvSpPr>
         <p:spPr>
           <a:xfrm>
-            <a:off x="8353508" y="812500"/>
-            <a:ext cx="2592469" cy="17288615"/>
+            <a:off x="8353509" y="836775"/>
+            <a:ext cx="2592469" cy="17805135"/>
           </a:xfrm>
         </p:spPr>
         <p:txBody>
@@ -576,8 +576,8 @@
         </p:nvSpPr>
         <p:spPr>
           <a:xfrm>
-            <a:off x="576108" y="812500"/>
-            <a:ext cx="7585366" cy="17288615"/>
+            <a:off x="576108" y="836775"/>
+            <a:ext cx="7585366" cy="17805135"/>
           </a:xfrm>
         </p:spPr>
         <p:txBody>
@@ -898,8 +898,8 @@
         </p:nvSpPr>
         <p:spPr>
           <a:xfrm>
-            <a:off x="910165" y="7750842"/>
-            <a:ext cx="9793764" cy="2395612"/>
+            <a:off x="910165" y="7982409"/>
+            <a:ext cx="9793764" cy="2467184"/>
           </a:xfrm>
         </p:spPr>
         <p:txBody>
@@ -930,8 +930,8 @@
         </p:nvSpPr>
         <p:spPr>
           <a:xfrm>
-            <a:off x="910165" y="5112320"/>
-            <a:ext cx="9793764" cy="2638524"/>
+            <a:off x="910165" y="5265058"/>
+            <a:ext cx="9793764" cy="2717353"/>
           </a:xfrm>
         </p:spPr>
         <p:txBody>
@@ -1167,8 +1167,8 @@
         </p:nvSpPr>
         <p:spPr>
           <a:xfrm>
-            <a:off x="576108" y="4729802"/>
-            <a:ext cx="5088915" cy="13371316"/>
+            <a:off x="576109" y="4871111"/>
+            <a:ext cx="5088915" cy="13770802"/>
           </a:xfrm>
         </p:spPr>
         <p:txBody>
@@ -1252,8 +1252,8 @@
         </p:nvSpPr>
         <p:spPr>
           <a:xfrm>
-            <a:off x="5857058" y="4729802"/>
-            <a:ext cx="5088915" cy="13371316"/>
+            <a:off x="5857059" y="4871111"/>
+            <a:ext cx="5088915" cy="13770802"/>
           </a:xfrm>
         </p:spPr>
         <p:txBody>
@@ -1432,8 +1432,8 @@
         </p:nvSpPr>
         <p:spPr>
           <a:xfrm>
-            <a:off x="576105" y="483031"/>
-            <a:ext cx="10369868" cy="2010305"/>
+            <a:off x="576105" y="497462"/>
+            <a:ext cx="10369868" cy="2070366"/>
           </a:xfrm>
         </p:spPr>
         <p:txBody>
@@ -1464,8 +1464,8 @@
         </p:nvSpPr>
         <p:spPr>
           <a:xfrm>
-            <a:off x="576104" y="2699952"/>
-            <a:ext cx="5090918" cy="1125210"/>
+            <a:off x="576104" y="2780617"/>
+            <a:ext cx="5090918" cy="1158827"/>
           </a:xfrm>
         </p:spPr>
         <p:txBody>
@@ -1529,8 +1529,8 @@
         </p:nvSpPr>
         <p:spPr>
           <a:xfrm>
-            <a:off x="576104" y="3825164"/>
-            <a:ext cx="5090918" cy="6949511"/>
+            <a:off x="576104" y="3939446"/>
+            <a:ext cx="5090918" cy="7157137"/>
           </a:xfrm>
         </p:spPr>
         <p:txBody>
@@ -1614,8 +1614,8 @@
         </p:nvSpPr>
         <p:spPr>
           <a:xfrm>
-            <a:off x="5853059" y="2699952"/>
-            <a:ext cx="5092917" cy="1125210"/>
+            <a:off x="5853060" y="2780617"/>
+            <a:ext cx="5092917" cy="1158827"/>
           </a:xfrm>
         </p:spPr>
         <p:txBody>
@@ -1679,8 +1679,8 @@
         </p:nvSpPr>
         <p:spPr>
           <a:xfrm>
-            <a:off x="5853059" y="3825164"/>
-            <a:ext cx="5092917" cy="6949511"/>
+            <a:off x="5853060" y="3939446"/>
+            <a:ext cx="5092917" cy="7157137"/>
           </a:xfrm>
         </p:spPr>
         <p:txBody>
@@ -2072,8 +2072,8 @@
         </p:nvSpPr>
         <p:spPr>
           <a:xfrm>
-            <a:off x="576109" y="480240"/>
-            <a:ext cx="3790684" cy="2043808"/>
+            <a:off x="576109" y="494588"/>
+            <a:ext cx="3790684" cy="2104869"/>
           </a:xfrm>
         </p:spPr>
         <p:txBody>
@@ -2104,8 +2104,8 @@
         </p:nvSpPr>
         <p:spPr>
           <a:xfrm>
-            <a:off x="4504813" y="480241"/>
-            <a:ext cx="6441160" cy="10294434"/>
+            <a:off x="4504813" y="494589"/>
+            <a:ext cx="6441160" cy="10601994"/>
           </a:xfrm>
         </p:spPr>
         <p:txBody>
@@ -2189,8 +2189,8 @@
         </p:nvSpPr>
         <p:spPr>
           <a:xfrm>
-            <a:off x="576109" y="2524049"/>
-            <a:ext cx="3790684" cy="8250624"/>
+            <a:off x="576109" y="2599458"/>
+            <a:ext cx="3790684" cy="8497122"/>
           </a:xfrm>
         </p:spPr>
         <p:txBody>
@@ -2349,8 +2349,8 @@
         </p:nvSpPr>
         <p:spPr>
           <a:xfrm>
-            <a:off x="2258410" y="8443280"/>
-            <a:ext cx="6913245" cy="996776"/>
+            <a:off x="2258411" y="8695534"/>
+            <a:ext cx="6913245" cy="1026556"/>
           </a:xfrm>
         </p:spPr>
         <p:txBody>
@@ -2381,8 +2381,8 @@
         </p:nvSpPr>
         <p:spPr>
           <a:xfrm>
-            <a:off x="2258410" y="1077755"/>
-            <a:ext cx="6913245" cy="7237095"/>
+            <a:off x="2258411" y="1109955"/>
+            <a:ext cx="6913245" cy="7453313"/>
           </a:xfrm>
         </p:spPr>
         <p:txBody>
@@ -2442,8 +2442,8 @@
         </p:nvSpPr>
         <p:spPr>
           <a:xfrm>
-            <a:off x="2258410" y="9440064"/>
-            <a:ext cx="6913245" cy="1415588"/>
+            <a:off x="2258411" y="9722098"/>
+            <a:ext cx="6913245" cy="1457881"/>
           </a:xfrm>
         </p:spPr>
         <p:txBody>
@@ -2607,8 +2607,8 @@
         </p:nvSpPr>
         <p:spPr>
           <a:xfrm>
-            <a:off x="576105" y="483031"/>
-            <a:ext cx="10369868" cy="2010305"/>
+            <a:off x="576105" y="497462"/>
+            <a:ext cx="10369868" cy="2070366"/>
           </a:xfrm>
           <a:prstGeom prst="rect">
             <a:avLst/>
@@ -2640,8 +2640,8 @@
         </p:nvSpPr>
         <p:spPr>
           <a:xfrm>
-            <a:off x="576105" y="2814436"/>
-            <a:ext cx="10369868" cy="7960246"/>
+            <a:off x="576105" y="2898521"/>
+            <a:ext cx="10369868" cy="8198069"/>
           </a:xfrm>
           <a:prstGeom prst="rect">
             <a:avLst/>
@@ -2702,8 +2702,8 @@
         </p:nvSpPr>
         <p:spPr>
           <a:xfrm>
-            <a:off x="576108" y="11179528"/>
-            <a:ext cx="2688484" cy="642181"/>
+            <a:off x="576108" y="11513532"/>
+            <a:ext cx="2688484" cy="661367"/>
           </a:xfrm>
           <a:prstGeom prst="rect">
             <a:avLst/>
@@ -2743,8 +2743,8 @@
         </p:nvSpPr>
         <p:spPr>
           <a:xfrm>
-            <a:off x="3936710" y="11179528"/>
-            <a:ext cx="3648658" cy="642181"/>
+            <a:off x="3936710" y="11513532"/>
+            <a:ext cx="3648658" cy="661367"/>
           </a:xfrm>
           <a:prstGeom prst="rect">
             <a:avLst/>
@@ -2780,8 +2780,8 @@
         </p:nvSpPr>
         <p:spPr>
           <a:xfrm>
-            <a:off x="8257491" y="11179528"/>
-            <a:ext cx="2688484" cy="642181"/>
+            <a:off x="8257491" y="11513532"/>
+            <a:ext cx="2688484" cy="661367"/>
           </a:xfrm>
           <a:prstGeom prst="rect">
             <a:avLst/>
@@ -3100,15 +3100,79 @@
           <a:chExt cx="0" cy="0"/>
         </a:xfrm>
       </p:grpSpPr>
+      <p:pic>
+        <p:nvPicPr>
+          <p:cNvPr id="49" name="Picture 9"/>
+          <p:cNvPicPr>
+            <a:picLocks noChangeAspect="1" noChangeArrowheads="1"/>
+          </p:cNvPicPr>
+          <p:nvPr/>
+        </p:nvPicPr>
+        <p:blipFill>
+          <a:blip r:embed="rId2">
+            <a:extLst>
+              <a:ext uri="{28A0092B-C50C-407E-A947-70E740481C1C}">
+                <a14:useLocalDpi xmlns:a14="http://schemas.microsoft.com/office/drawing/2010/main" val="0"/>
+              </a:ext>
+            </a:extLst>
+          </a:blip>
+          <a:srcRect/>
+          <a:stretch>
+            <a:fillRect/>
+          </a:stretch>
+        </p:blipFill>
+        <p:spPr bwMode="auto">
+          <a:xfrm>
+            <a:off x="-71611" y="154800"/>
+            <a:ext cx="3422650" cy="8755062"/>
+          </a:xfrm>
+          <a:prstGeom prst="rect">
+            <a:avLst/>
+          </a:prstGeom>
+          <a:noFill/>
+          <a:ln>
+            <a:noFill/>
+          </a:ln>
+          <a:effectLst/>
+          <a:extLst>
+            <a:ext uri="{909E8E84-426E-40DD-AFC4-6F175D3DCCD1}">
+              <a14:hiddenFill xmlns:a14="http://schemas.microsoft.com/office/drawing/2010/main">
+                <a:solidFill>
+                  <a:schemeClr val="accent1"/>
+                </a:solidFill>
+              </a14:hiddenFill>
+            </a:ext>
+            <a:ext uri="{91240B29-F687-4F45-9708-019B960494DF}">
+              <a14:hiddenLine xmlns:a14="http://schemas.microsoft.com/office/drawing/2010/main" w="9525">
+                <a:solidFill>
+                  <a:schemeClr val="tx1"/>
+                </a:solidFill>
+                <a:miter lim="800000"/>
+                <a:headEnd/>
+                <a:tailEnd/>
+              </a14:hiddenLine>
+            </a:ext>
+            <a:ext uri="{AF507438-7753-43E0-B8FC-AC1667EBCBE1}">
+              <a14:hiddenEffects xmlns:a14="http://schemas.microsoft.com/office/drawing/2010/main">
+                <a:effectLst>
+                  <a:outerShdw dist="35921" dir="2700000" algn="ctr" rotWithShape="0">
+                    <a:schemeClr val="bg2"/>
+                  </a:outerShdw>
+                </a:effectLst>
+              </a14:hiddenEffects>
+            </a:ext>
+          </a:extLst>
+        </p:spPr>
+      </p:pic>
       <p:grpSp>
         <p:nvGrpSpPr>
-          <p:cNvPr id="110" name="Groupe 109"/>
+          <p:cNvPr id="50" name="Groupe 49"/>
           <p:cNvGrpSpPr/>
           <p:nvPr/>
         </p:nvGrpSpPr>
         <p:grpSpPr>
           <a:xfrm>
-            <a:off x="3204000" y="-108247"/>
+            <a:off x="3374258" y="-108247"/>
             <a:ext cx="3600000" cy="6293073"/>
             <a:chOff x="8803382" y="1592038"/>
             <a:chExt cx="3600000" cy="6293073"/>
@@ -3116,14 +3180,14 @@
         </p:grpSpPr>
         <p:pic>
           <p:nvPicPr>
-            <p:cNvPr id="111" name="Picture 19"/>
+            <p:cNvPr id="51" name="Picture 19"/>
             <p:cNvPicPr>
               <a:picLocks noChangeAspect="1" noChangeArrowheads="1"/>
             </p:cNvPicPr>
             <p:nvPr/>
           </p:nvPicPr>
           <p:blipFill>
-            <a:blip r:embed="rId2">
+            <a:blip r:embed="rId3">
               <a:extLst>
                 <a:ext uri="{28A0092B-C50C-407E-A947-70E740481C1C}">
                   <a14:useLocalDpi xmlns:a14="http://schemas.microsoft.com/office/drawing/2010/main" val="0"/>
@@ -3180,7 +3244,7 @@
         </p:pic>
         <p:sp>
           <p:nvSpPr>
-            <p:cNvPr id="112" name="ZoneTexte 111"/>
+            <p:cNvPr id="52" name="ZoneTexte 51"/>
             <p:cNvSpPr txBox="1"/>
             <p:nvPr/>
           </p:nvSpPr>
@@ -3217,13 +3281,13 @@
       </p:grpSp>
       <p:grpSp>
         <p:nvGrpSpPr>
-          <p:cNvPr id="113" name="Groupe 112"/>
+          <p:cNvPr id="53" name="Groupe 52"/>
           <p:cNvGrpSpPr/>
           <p:nvPr/>
         </p:nvGrpSpPr>
         <p:grpSpPr>
           <a:xfrm>
-            <a:off x="3054537" y="6156449"/>
+            <a:off x="3224795" y="6534968"/>
             <a:ext cx="3786149" cy="5904656"/>
             <a:chOff x="4014217" y="5617021"/>
             <a:chExt cx="3786149" cy="5904656"/>
@@ -3231,14 +3295,14 @@
         </p:grpSpPr>
         <p:pic>
           <p:nvPicPr>
-            <p:cNvPr id="114" name="Picture 14"/>
+            <p:cNvPr id="54" name="Picture 14"/>
             <p:cNvPicPr>
               <a:picLocks noChangeAspect="1" noChangeArrowheads="1"/>
             </p:cNvPicPr>
             <p:nvPr/>
           </p:nvPicPr>
           <p:blipFill rotWithShape="1">
-            <a:blip r:embed="rId3">
+            <a:blip r:embed="rId4">
               <a:extLst>
                 <a:ext uri="{28A0092B-C50C-407E-A947-70E740481C1C}">
                   <a14:useLocalDpi xmlns:a14="http://schemas.microsoft.com/office/drawing/2010/main" val="0"/>
@@ -3293,7 +3357,7 @@
         </p:pic>
         <p:sp>
           <p:nvSpPr>
-            <p:cNvPr id="115" name="ZoneTexte 114"/>
+            <p:cNvPr id="55" name="ZoneTexte 54"/>
             <p:cNvSpPr txBox="1"/>
             <p:nvPr/>
           </p:nvSpPr>
@@ -3328,215 +3392,136 @@
           </p:txBody>
         </p:sp>
       </p:grpSp>
-      <p:grpSp>
-        <p:nvGrpSpPr>
-          <p:cNvPr id="116" name="Groupe 115"/>
-          <p:cNvGrpSpPr/>
+      <p:sp>
+        <p:nvSpPr>
+          <p:cNvPr id="56" name="ZoneTexte 55"/>
+          <p:cNvSpPr txBox="1"/>
           <p:nvPr/>
-        </p:nvGrpSpPr>
-        <p:grpSpPr>
+        </p:nvSpPr>
+        <p:spPr>
           <a:xfrm>
-            <a:off x="0" y="1828504"/>
-            <a:ext cx="3076575" cy="7173020"/>
-            <a:chOff x="4104382" y="809997"/>
-            <a:chExt cx="3076575" cy="7173020"/>
+            <a:off x="736588" y="-119385"/>
+            <a:ext cx="526106" cy="461665"/>
           </a:xfrm>
-        </p:grpSpPr>
-        <p:pic>
-          <p:nvPicPr>
-            <p:cNvPr id="117" name="Picture 2"/>
-            <p:cNvPicPr>
-              <a:picLocks noChangeAspect="1" noChangeArrowheads="1"/>
-            </p:cNvPicPr>
-            <p:nvPr/>
-          </p:nvPicPr>
-          <p:blipFill>
-            <a:blip r:embed="rId4">
-              <a:extLst>
-                <a:ext uri="{28A0092B-C50C-407E-A947-70E740481C1C}">
-                  <a14:useLocalDpi xmlns:a14="http://schemas.microsoft.com/office/drawing/2010/main" val="0"/>
-                </a:ext>
-              </a:extLst>
-            </a:blip>
-            <a:srcRect/>
-            <a:stretch>
-              <a:fillRect/>
-            </a:stretch>
-          </p:blipFill>
-          <p:spPr bwMode="auto">
-            <a:xfrm>
-              <a:off x="4104382" y="1098029"/>
-              <a:ext cx="3076575" cy="6884988"/>
-            </a:xfrm>
-            <a:prstGeom prst="rect">
-              <a:avLst/>
-            </a:prstGeom>
-            <a:noFill/>
-            <a:ln>
-              <a:noFill/>
-            </a:ln>
-            <a:effectLst/>
-            <a:extLst>
-              <a:ext uri="{909E8E84-426E-40DD-AFC4-6F175D3DCCD1}">
-                <a14:hiddenFill xmlns:a14="http://schemas.microsoft.com/office/drawing/2010/main">
-                  <a:solidFill>
-                    <a:schemeClr val="accent1"/>
-                  </a:solidFill>
-                </a14:hiddenFill>
-              </a:ext>
-              <a:ext uri="{91240B29-F687-4F45-9708-019B960494DF}">
-                <a14:hiddenLine xmlns:a14="http://schemas.microsoft.com/office/drawing/2010/main" w="9525">
-                  <a:solidFill>
-                    <a:schemeClr val="tx1"/>
-                  </a:solidFill>
-                  <a:miter lim="800000"/>
-                  <a:headEnd/>
-                  <a:tailEnd/>
-                </a14:hiddenLine>
-              </a:ext>
-              <a:ext uri="{AF507438-7753-43E0-B8FC-AC1667EBCBE1}">
-                <a14:hiddenEffects xmlns:a14="http://schemas.microsoft.com/office/drawing/2010/main">
-                  <a:effectLst>
-                    <a:outerShdw dist="35921" dir="2700000" algn="ctr" rotWithShape="0">
-                      <a:schemeClr val="bg2"/>
-                    </a:outerShdw>
-                  </a:effectLst>
-                </a14:hiddenEffects>
-              </a:ext>
-            </a:extLst>
-          </p:spPr>
-        </p:pic>
-        <p:sp>
-          <p:nvSpPr>
-            <p:cNvPr id="118" name="ZoneTexte 117"/>
-            <p:cNvSpPr txBox="1"/>
-            <p:nvPr/>
-          </p:nvSpPr>
-          <p:spPr>
-            <a:xfrm>
-              <a:off x="4874420" y="809997"/>
-              <a:ext cx="526106" cy="461665"/>
-            </a:xfrm>
-            <a:prstGeom prst="rect">
-              <a:avLst/>
-            </a:prstGeom>
-            <a:noFill/>
-          </p:spPr>
-          <p:txBody>
-            <a:bodyPr wrap="none" rtlCol="0">
-              <a:spAutoFit/>
-            </a:bodyPr>
-            <a:lstStyle/>
-            <a:p>
-              <a:r>
-                <a:rPr lang="fr-FR" sz="2400" dirty="0" smtClean="0">
-                  <a:latin typeface="Times New Roman" pitchFamily="18" charset="0"/>
-                  <a:cs typeface="Times New Roman" pitchFamily="18" charset="0"/>
-                </a:rPr>
-                <a:t>(a)</a:t>
-              </a:r>
-              <a:endParaRPr lang="fr-FR" sz="2400" dirty="0">
+          <a:prstGeom prst="rect">
+            <a:avLst/>
+          </a:prstGeom>
+          <a:noFill/>
+        </p:spPr>
+        <p:txBody>
+          <a:bodyPr wrap="none" rtlCol="0">
+            <a:spAutoFit/>
+          </a:bodyPr>
+          <a:lstStyle/>
+          <a:p>
+            <a:r>
+              <a:rPr lang="fr-FR" sz="2400" dirty="0" smtClean="0">
                 <a:latin typeface="Times New Roman" pitchFamily="18" charset="0"/>
                 <a:cs typeface="Times New Roman" pitchFamily="18" charset="0"/>
-              </a:endParaRPr>
-            </a:p>
-          </p:txBody>
-        </p:sp>
-        <p:sp>
-          <p:nvSpPr>
-            <p:cNvPr id="119" name="Rectangle 118"/>
-            <p:cNvSpPr/>
-            <p:nvPr/>
-          </p:nvSpPr>
-          <p:spPr>
-            <a:xfrm>
-              <a:off x="5642668" y="7330576"/>
-              <a:ext cx="261913" cy="144016"/>
-            </a:xfrm>
-            <a:prstGeom prst="rect">
-              <a:avLst/>
-            </a:prstGeom>
-            <a:noFill/>
-            <a:ln w="12700"/>
-          </p:spPr>
-          <p:style>
-            <a:lnRef idx="2">
-              <a:schemeClr val="accent1">
-                <a:shade val="50000"/>
-              </a:schemeClr>
-            </a:lnRef>
-            <a:fillRef idx="1">
-              <a:schemeClr val="accent1"/>
-            </a:fillRef>
-            <a:effectRef idx="0">
-              <a:schemeClr val="accent1"/>
-            </a:effectRef>
-            <a:fontRef idx="minor">
-              <a:schemeClr val="lt1"/>
-            </a:fontRef>
-          </p:style>
-          <p:txBody>
-            <a:bodyPr rtlCol="0" anchor="ctr"/>
-            <a:lstStyle/>
-            <a:p>
-              <a:pPr algn="ctr"/>
-              <a:endParaRPr lang="fr-FR"/>
-            </a:p>
-          </p:txBody>
-        </p:sp>
-        <p:sp>
-          <p:nvSpPr>
-            <p:cNvPr id="120" name="Rectangle 119"/>
-            <p:cNvSpPr/>
-            <p:nvPr/>
-          </p:nvSpPr>
-          <p:spPr>
-            <a:xfrm>
-              <a:off x="5004382" y="4266381"/>
-              <a:ext cx="1764000" cy="2304255"/>
-            </a:xfrm>
-            <a:prstGeom prst="rect">
-              <a:avLst/>
-            </a:prstGeom>
-            <a:noFill/>
-            <a:ln w="12700"/>
-          </p:spPr>
-          <p:style>
-            <a:lnRef idx="2">
-              <a:schemeClr val="accent1">
-                <a:shade val="50000"/>
-              </a:schemeClr>
-            </a:lnRef>
-            <a:fillRef idx="1">
-              <a:schemeClr val="accent1"/>
-            </a:fillRef>
-            <a:effectRef idx="0">
-              <a:schemeClr val="accent1"/>
-            </a:effectRef>
-            <a:fontRef idx="minor">
-              <a:schemeClr val="lt1"/>
-            </a:fontRef>
-          </p:style>
-          <p:txBody>
-            <a:bodyPr rtlCol="0" anchor="ctr"/>
-            <a:lstStyle/>
-            <a:p>
-              <a:pPr algn="ctr"/>
-              <a:endParaRPr lang="fr-FR"/>
-            </a:p>
-          </p:txBody>
-        </p:sp>
-      </p:grpSp>
+              </a:rPr>
+              <a:t>(a)</a:t>
+            </a:r>
+            <a:endParaRPr lang="fr-FR" sz="2400" dirty="0">
+              <a:latin typeface="Times New Roman" pitchFamily="18" charset="0"/>
+              <a:cs typeface="Times New Roman" pitchFamily="18" charset="0"/>
+            </a:endParaRPr>
+          </a:p>
+        </p:txBody>
+      </p:sp>
+      <p:sp>
+        <p:nvSpPr>
+          <p:cNvPr id="57" name="Rectangle 56"/>
+          <p:cNvSpPr/>
+          <p:nvPr/>
+        </p:nvSpPr>
+        <p:spPr>
+          <a:xfrm>
+            <a:off x="1620000" y="8244000"/>
+            <a:ext cx="261913" cy="144016"/>
+          </a:xfrm>
+          <a:prstGeom prst="rect">
+            <a:avLst/>
+          </a:prstGeom>
+          <a:noFill/>
+          <a:ln w="12700"/>
+        </p:spPr>
+        <p:style>
+          <a:lnRef idx="2">
+            <a:schemeClr val="accent1">
+              <a:shade val="50000"/>
+            </a:schemeClr>
+          </a:lnRef>
+          <a:fillRef idx="1">
+            <a:schemeClr val="accent1"/>
+          </a:fillRef>
+          <a:effectRef idx="0">
+            <a:schemeClr val="accent1"/>
+          </a:effectRef>
+          <a:fontRef idx="minor">
+            <a:schemeClr val="lt1"/>
+          </a:fontRef>
+        </p:style>
+        <p:txBody>
+          <a:bodyPr rtlCol="0" anchor="ctr"/>
+          <a:lstStyle/>
+          <a:p>
+            <a:pPr algn="ctr"/>
+            <a:endParaRPr lang="fr-FR"/>
+          </a:p>
+        </p:txBody>
+      </p:sp>
+      <p:sp>
+        <p:nvSpPr>
+          <p:cNvPr id="58" name="Rectangle 57"/>
+          <p:cNvSpPr/>
+          <p:nvPr/>
+        </p:nvSpPr>
+        <p:spPr>
+          <a:xfrm>
+            <a:off x="828000" y="5284888"/>
+            <a:ext cx="2106000" cy="2304255"/>
+          </a:xfrm>
+          <a:prstGeom prst="rect">
+            <a:avLst/>
+          </a:prstGeom>
+          <a:noFill/>
+          <a:ln w="12700"/>
+        </p:spPr>
+        <p:style>
+          <a:lnRef idx="2">
+            <a:schemeClr val="accent1">
+              <a:shade val="50000"/>
+            </a:schemeClr>
+          </a:lnRef>
+          <a:fillRef idx="1">
+            <a:schemeClr val="accent1"/>
+          </a:fillRef>
+          <a:effectRef idx="0">
+            <a:schemeClr val="accent1"/>
+          </a:effectRef>
+          <a:fontRef idx="minor">
+            <a:schemeClr val="lt1"/>
+          </a:fontRef>
+        </p:style>
+        <p:txBody>
+          <a:bodyPr rtlCol="0" anchor="ctr"/>
+          <a:lstStyle/>
+          <a:p>
+            <a:pPr algn="ctr"/>
+            <a:endParaRPr lang="fr-FR"/>
+          </a:p>
+        </p:txBody>
+      </p:sp>
       <p:cxnSp>
         <p:nvCxnSpPr>
-          <p:cNvPr id="121" name="Connecteur droit 120"/>
+          <p:cNvPr id="59" name="Connecteur droit 58"/>
           <p:cNvCxnSpPr/>
           <p:nvPr/>
         </p:nvCxnSpPr>
         <p:spPr>
           <a:xfrm flipH="1" flipV="1">
-            <a:off x="1800199" y="8493099"/>
-            <a:ext cx="2187396" cy="2984477"/>
+            <a:off x="1881913" y="8388017"/>
+            <a:ext cx="2294948" cy="3475543"/>
           </a:xfrm>
           <a:prstGeom prst="line">
             <a:avLst/>
@@ -3559,13 +3544,13 @@
       </p:cxnSp>
       <p:grpSp>
         <p:nvGrpSpPr>
-          <p:cNvPr id="122" name="Groupe 121"/>
+          <p:cNvPr id="60" name="Groupe 59"/>
           <p:cNvGrpSpPr/>
           <p:nvPr/>
         </p:nvGrpSpPr>
         <p:grpSpPr>
           <a:xfrm>
-            <a:off x="6480646" y="1547937"/>
+            <a:off x="6650904" y="1547937"/>
             <a:ext cx="5230813" cy="3562556"/>
             <a:chOff x="7496372" y="1148916"/>
             <a:chExt cx="5230813" cy="3562556"/>
@@ -3573,7 +3558,7 @@
         </p:grpSpPr>
         <p:pic>
           <p:nvPicPr>
-            <p:cNvPr id="123" name="Picture 18"/>
+            <p:cNvPr id="61" name="Picture 18"/>
             <p:cNvPicPr>
               <a:picLocks noChangeAspect="1" noChangeArrowheads="1"/>
             </p:cNvPicPr>
@@ -3637,7 +3622,7 @@
         </p:pic>
         <p:sp>
           <p:nvSpPr>
-            <p:cNvPr id="124" name="ZoneTexte 123"/>
+            <p:cNvPr id="62" name="ZoneTexte 61"/>
             <p:cNvSpPr txBox="1"/>
             <p:nvPr/>
           </p:nvSpPr>
@@ -3674,14 +3659,14 @@
       </p:grpSp>
       <p:cxnSp>
         <p:nvCxnSpPr>
-          <p:cNvPr id="125" name="Connecteur droit 124"/>
+          <p:cNvPr id="63" name="Connecteur droit 62"/>
           <p:cNvCxnSpPr/>
           <p:nvPr/>
         </p:nvCxnSpPr>
         <p:spPr>
           <a:xfrm flipV="1">
-            <a:off x="2664000" y="5644928"/>
-            <a:ext cx="1368374" cy="1944216"/>
+            <a:off x="2934000" y="5670872"/>
+            <a:ext cx="1242861" cy="1918272"/>
           </a:xfrm>
           <a:prstGeom prst="line">
             <a:avLst/>
@@ -3704,14 +3689,14 @@
       </p:cxnSp>
       <p:cxnSp>
         <p:nvCxnSpPr>
-          <p:cNvPr id="126" name="Connecteur droit 125"/>
+          <p:cNvPr id="64" name="Connecteur droit 63"/>
           <p:cNvCxnSpPr/>
           <p:nvPr/>
         </p:nvCxnSpPr>
         <p:spPr>
           <a:xfrm flipV="1">
-            <a:off x="2664000" y="381541"/>
-            <a:ext cx="1323595" cy="4903347"/>
+            <a:off x="2934000" y="381542"/>
+            <a:ext cx="1242861" cy="4903346"/>
           </a:xfrm>
           <a:prstGeom prst="line">
             <a:avLst/>
@@ -3734,14 +3719,14 @@
       </p:cxnSp>
       <p:cxnSp>
         <p:nvCxnSpPr>
-          <p:cNvPr id="127" name="Connecteur droit 126"/>
+          <p:cNvPr id="65" name="Connecteur droit 64"/>
           <p:cNvCxnSpPr/>
           <p:nvPr/>
         </p:nvCxnSpPr>
         <p:spPr>
           <a:xfrm flipV="1">
-            <a:off x="1800199" y="6689044"/>
-            <a:ext cx="2160167" cy="1660040"/>
+            <a:off x="1881913" y="6996633"/>
+            <a:ext cx="2294948" cy="1247367"/>
           </a:xfrm>
           <a:prstGeom prst="line">
             <a:avLst/>
@@ -3764,13 +3749,13 @@
       </p:cxnSp>
       <p:grpSp>
         <p:nvGrpSpPr>
-          <p:cNvPr id="143" name="Groupe 142"/>
+          <p:cNvPr id="66" name="Groupe 65"/>
           <p:cNvGrpSpPr/>
           <p:nvPr/>
         </p:nvGrpSpPr>
         <p:grpSpPr>
           <a:xfrm>
-            <a:off x="7010615" y="7092553"/>
+            <a:off x="7180873" y="7471072"/>
             <a:ext cx="3826825" cy="4136605"/>
             <a:chOff x="8083053" y="6625133"/>
             <a:chExt cx="3826825" cy="4136605"/>
@@ -3778,7 +3763,7 @@
         </p:grpSpPr>
         <p:pic>
           <p:nvPicPr>
-            <p:cNvPr id="144" name="Picture 16"/>
+            <p:cNvPr id="67" name="Picture 16"/>
             <p:cNvPicPr>
               <a:picLocks noChangeAspect="1" noChangeArrowheads="1"/>
             </p:cNvPicPr>
@@ -3840,7 +3825,7 @@
         </p:pic>
         <p:sp>
           <p:nvSpPr>
-            <p:cNvPr id="145" name="ZoneTexte 144"/>
+            <p:cNvPr id="68" name="ZoneTexte 67"/>
             <p:cNvSpPr txBox="1"/>
             <p:nvPr/>
           </p:nvSpPr>
@@ -3877,13 +3862,13 @@
       </p:grpSp>
       <p:sp>
         <p:nvSpPr>
-          <p:cNvPr id="23" name="Rectangle 22"/>
+          <p:cNvPr id="69" name="Rectangle 68"/>
           <p:cNvSpPr/>
           <p:nvPr/>
         </p:nvSpPr>
         <p:spPr>
           <a:xfrm>
-            <a:off x="4712057" y="4878784"/>
+            <a:off x="4882315" y="4878784"/>
             <a:ext cx="1553036" cy="360040"/>
           </a:xfrm>
           <a:prstGeom prst="rect">
@@ -3919,13 +3904,13 @@
       </p:sp>
       <p:cxnSp>
         <p:nvCxnSpPr>
-          <p:cNvPr id="24" name="Connecteur droit 23"/>
+          <p:cNvPr id="70" name="Connecteur droit 69"/>
           <p:cNvCxnSpPr/>
           <p:nvPr/>
         </p:nvCxnSpPr>
         <p:spPr>
           <a:xfrm flipV="1">
-            <a:off x="6265093" y="2009602"/>
+            <a:off x="6435351" y="2009602"/>
             <a:ext cx="1296144" cy="2869182"/>
           </a:xfrm>
           <a:prstGeom prst="line">
@@ -3949,13 +3934,13 @@
       </p:cxnSp>
       <p:cxnSp>
         <p:nvCxnSpPr>
-          <p:cNvPr id="27" name="Connecteur droit 26"/>
+          <p:cNvPr id="71" name="Connecteur droit 70"/>
           <p:cNvCxnSpPr/>
           <p:nvPr/>
         </p:nvCxnSpPr>
         <p:spPr>
           <a:xfrm flipV="1">
-            <a:off x="6265093" y="4446736"/>
+            <a:off x="6435351" y="4446736"/>
             <a:ext cx="1296144" cy="792088"/>
           </a:xfrm>
           <a:prstGeom prst="line">

</xml_diff>

<commit_message>
Chap04: Correction of PLE part. Proofreading needed.
</commit_message>
<xml_diff>
--- a/04-CrMagOpt/Pictures/FullPLEv2.pptx
+++ b/04-CrMagOpt/Pictures/FullPLEv2.pptx
@@ -7,7 +7,7 @@
   <p:sldIdLst>
     <p:sldId id="256" r:id="rId2"/>
   </p:sldIdLst>
-  <p:sldSz cx="11522075" cy="12422188"/>
+  <p:sldSz cx="11522075" cy="12312650"/>
   <p:notesSz cx="6858000" cy="9144000"/>
   <p:defaultTextStyle>
     <a:defPPr>
@@ -136,8 +136,8 @@
         </p:nvSpPr>
         <p:spPr>
           <a:xfrm>
-            <a:off x="864159" y="3858931"/>
-            <a:ext cx="9793764" cy="2662718"/>
+            <a:off x="864159" y="3824904"/>
+            <a:ext cx="9793764" cy="2639238"/>
           </a:xfrm>
         </p:spPr>
         <p:txBody>
@@ -164,8 +164,8 @@
         </p:nvSpPr>
         <p:spPr>
           <a:xfrm>
-            <a:off x="1728316" y="7039242"/>
-            <a:ext cx="8065452" cy="3174558"/>
+            <a:off x="1728316" y="6977171"/>
+            <a:ext cx="8065452" cy="3146565"/>
           </a:xfrm>
         </p:spPr>
         <p:txBody>
@@ -288,7 +288,7 @@
           <a:p>
             <a:fld id="{9C22C921-E2D9-4C60-A0F4-174E9EFE7024}" type="datetimeFigureOut">
               <a:rPr lang="fr-FR" smtClean="0"/>
-              <a:t>09/05/2017</a:t>
+              <a:t>30/06/2017</a:t>
             </a:fld>
             <a:endParaRPr lang="fr-FR"/>
           </a:p>
@@ -458,7 +458,7 @@
           <a:p>
             <a:fld id="{9C22C921-E2D9-4C60-A0F4-174E9EFE7024}" type="datetimeFigureOut">
               <a:rPr lang="fr-FR" smtClean="0"/>
-              <a:t>09/05/2017</a:t>
+              <a:t>30/06/2017</a:t>
             </a:fld>
             <a:endParaRPr lang="fr-FR"/>
           </a:p>
@@ -548,8 +548,8 @@
         </p:nvSpPr>
         <p:spPr>
           <a:xfrm>
-            <a:off x="8353509" y="836775"/>
-            <a:ext cx="2592469" cy="17805135"/>
+            <a:off x="8353512" y="829397"/>
+            <a:ext cx="2592469" cy="17648131"/>
           </a:xfrm>
         </p:spPr>
         <p:txBody>
@@ -576,8 +576,8 @@
         </p:nvSpPr>
         <p:spPr>
           <a:xfrm>
-            <a:off x="576108" y="836775"/>
-            <a:ext cx="7585366" cy="17805135"/>
+            <a:off x="576108" y="829397"/>
+            <a:ext cx="7585366" cy="17648131"/>
           </a:xfrm>
         </p:spPr>
         <p:txBody>
@@ -638,7 +638,7 @@
           <a:p>
             <a:fld id="{9C22C921-E2D9-4C60-A0F4-174E9EFE7024}" type="datetimeFigureOut">
               <a:rPr lang="fr-FR" smtClean="0"/>
-              <a:t>09/05/2017</a:t>
+              <a:t>30/06/2017</a:t>
             </a:fld>
             <a:endParaRPr lang="fr-FR"/>
           </a:p>
@@ -808,7 +808,7 @@
           <a:p>
             <a:fld id="{9C22C921-E2D9-4C60-A0F4-174E9EFE7024}" type="datetimeFigureOut">
               <a:rPr lang="fr-FR" smtClean="0"/>
-              <a:t>09/05/2017</a:t>
+              <a:t>30/06/2017</a:t>
             </a:fld>
             <a:endParaRPr lang="fr-FR"/>
           </a:p>
@@ -898,8 +898,8 @@
         </p:nvSpPr>
         <p:spPr>
           <a:xfrm>
-            <a:off x="910165" y="7982409"/>
-            <a:ext cx="9793764" cy="2467184"/>
+            <a:off x="910165" y="7912021"/>
+            <a:ext cx="9793764" cy="2445428"/>
           </a:xfrm>
         </p:spPr>
         <p:txBody>
@@ -930,8 +930,8 @@
         </p:nvSpPr>
         <p:spPr>
           <a:xfrm>
-            <a:off x="910165" y="5265058"/>
-            <a:ext cx="9793764" cy="2717353"/>
+            <a:off x="910165" y="5218632"/>
+            <a:ext cx="9793764" cy="2693392"/>
           </a:xfrm>
         </p:spPr>
         <p:txBody>
@@ -1054,7 +1054,7 @@
           <a:p>
             <a:fld id="{9C22C921-E2D9-4C60-A0F4-174E9EFE7024}" type="datetimeFigureOut">
               <a:rPr lang="fr-FR" smtClean="0"/>
-              <a:t>09/05/2017</a:t>
+              <a:t>30/06/2017</a:t>
             </a:fld>
             <a:endParaRPr lang="fr-FR"/>
           </a:p>
@@ -1167,8 +1167,8 @@
         </p:nvSpPr>
         <p:spPr>
           <a:xfrm>
-            <a:off x="576109" y="4871111"/>
-            <a:ext cx="5088915" cy="13770802"/>
+            <a:off x="576112" y="4828159"/>
+            <a:ext cx="5088915" cy="13649372"/>
           </a:xfrm>
         </p:spPr>
         <p:txBody>
@@ -1252,8 +1252,8 @@
         </p:nvSpPr>
         <p:spPr>
           <a:xfrm>
-            <a:off x="5857059" y="4871111"/>
-            <a:ext cx="5088915" cy="13770802"/>
+            <a:off x="5857062" y="4828159"/>
+            <a:ext cx="5088915" cy="13649372"/>
           </a:xfrm>
         </p:spPr>
         <p:txBody>
@@ -1342,7 +1342,7 @@
           <a:p>
             <a:fld id="{9C22C921-E2D9-4C60-A0F4-174E9EFE7024}" type="datetimeFigureOut">
               <a:rPr lang="fr-FR" smtClean="0"/>
-              <a:t>09/05/2017</a:t>
+              <a:t>30/06/2017</a:t>
             </a:fld>
             <a:endParaRPr lang="fr-FR"/>
           </a:p>
@@ -1432,8 +1432,8 @@
         </p:nvSpPr>
         <p:spPr>
           <a:xfrm>
-            <a:off x="576105" y="497462"/>
-            <a:ext cx="10369868" cy="2070366"/>
+            <a:off x="576105" y="493077"/>
+            <a:ext cx="10369868" cy="2052109"/>
           </a:xfrm>
         </p:spPr>
         <p:txBody>
@@ -1464,8 +1464,8 @@
         </p:nvSpPr>
         <p:spPr>
           <a:xfrm>
-            <a:off x="576104" y="2780617"/>
-            <a:ext cx="5090918" cy="1158827"/>
+            <a:off x="576104" y="2756099"/>
+            <a:ext cx="5090918" cy="1148608"/>
           </a:xfrm>
         </p:spPr>
         <p:txBody>
@@ -1529,8 +1529,8 @@
         </p:nvSpPr>
         <p:spPr>
           <a:xfrm>
-            <a:off x="576104" y="3939446"/>
-            <a:ext cx="5090918" cy="7157137"/>
+            <a:off x="576104" y="3904709"/>
+            <a:ext cx="5090918" cy="7094026"/>
           </a:xfrm>
         </p:spPr>
         <p:txBody>
@@ -1614,8 +1614,8 @@
         </p:nvSpPr>
         <p:spPr>
           <a:xfrm>
-            <a:off x="5853060" y="2780617"/>
-            <a:ext cx="5092917" cy="1158827"/>
+            <a:off x="5853063" y="2756099"/>
+            <a:ext cx="5092917" cy="1148608"/>
           </a:xfrm>
         </p:spPr>
         <p:txBody>
@@ -1679,8 +1679,8 @@
         </p:nvSpPr>
         <p:spPr>
           <a:xfrm>
-            <a:off x="5853060" y="3939446"/>
-            <a:ext cx="5092917" cy="7157137"/>
+            <a:off x="5853063" y="3904709"/>
+            <a:ext cx="5092917" cy="7094026"/>
           </a:xfrm>
         </p:spPr>
         <p:txBody>
@@ -1769,7 +1769,7 @@
           <a:p>
             <a:fld id="{9C22C921-E2D9-4C60-A0F4-174E9EFE7024}" type="datetimeFigureOut">
               <a:rPr lang="fr-FR" smtClean="0"/>
-              <a:t>09/05/2017</a:t>
+              <a:t>30/06/2017</a:t>
             </a:fld>
             <a:endParaRPr lang="fr-FR"/>
           </a:p>
@@ -1887,7 +1887,7 @@
           <a:p>
             <a:fld id="{9C22C921-E2D9-4C60-A0F4-174E9EFE7024}" type="datetimeFigureOut">
               <a:rPr lang="fr-FR" smtClean="0"/>
-              <a:t>09/05/2017</a:t>
+              <a:t>30/06/2017</a:t>
             </a:fld>
             <a:endParaRPr lang="fr-FR"/>
           </a:p>
@@ -1982,7 +1982,7 @@
           <a:p>
             <a:fld id="{9C22C921-E2D9-4C60-A0F4-174E9EFE7024}" type="datetimeFigureOut">
               <a:rPr lang="fr-FR" smtClean="0"/>
-              <a:t>09/05/2017</a:t>
+              <a:t>30/06/2017</a:t>
             </a:fld>
             <a:endParaRPr lang="fr-FR"/>
           </a:p>
@@ -2072,8 +2072,8 @@
         </p:nvSpPr>
         <p:spPr>
           <a:xfrm>
-            <a:off x="576109" y="494588"/>
-            <a:ext cx="3790684" cy="2104869"/>
+            <a:off x="576109" y="490228"/>
+            <a:ext cx="3790684" cy="2086309"/>
           </a:xfrm>
         </p:spPr>
         <p:txBody>
@@ -2104,8 +2104,8 @@
         </p:nvSpPr>
         <p:spPr>
           <a:xfrm>
-            <a:off x="4504813" y="494589"/>
-            <a:ext cx="6441160" cy="10601994"/>
+            <a:off x="4504813" y="490228"/>
+            <a:ext cx="6441160" cy="10508507"/>
           </a:xfrm>
         </p:spPr>
         <p:txBody>
@@ -2189,8 +2189,8 @@
         </p:nvSpPr>
         <p:spPr>
           <a:xfrm>
-            <a:off x="576109" y="2599458"/>
-            <a:ext cx="3790684" cy="8497122"/>
+            <a:off x="576109" y="2576537"/>
+            <a:ext cx="3790684" cy="8422195"/>
           </a:xfrm>
         </p:spPr>
         <p:txBody>
@@ -2259,7 +2259,7 @@
           <a:p>
             <a:fld id="{9C22C921-E2D9-4C60-A0F4-174E9EFE7024}" type="datetimeFigureOut">
               <a:rPr lang="fr-FR" smtClean="0"/>
-              <a:t>09/05/2017</a:t>
+              <a:t>30/06/2017</a:t>
             </a:fld>
             <a:endParaRPr lang="fr-FR"/>
           </a:p>
@@ -2349,8 +2349,8 @@
         </p:nvSpPr>
         <p:spPr>
           <a:xfrm>
-            <a:off x="2258411" y="8695534"/>
-            <a:ext cx="6913245" cy="1026556"/>
+            <a:off x="2258414" y="8618859"/>
+            <a:ext cx="6913245" cy="1017503"/>
           </a:xfrm>
         </p:spPr>
         <p:txBody>
@@ -2381,8 +2381,8 @@
         </p:nvSpPr>
         <p:spPr>
           <a:xfrm>
-            <a:off x="2258411" y="1109955"/>
-            <a:ext cx="6913245" cy="7453313"/>
+            <a:off x="2258414" y="1100169"/>
+            <a:ext cx="6913245" cy="7387590"/>
           </a:xfrm>
         </p:spPr>
         <p:txBody>
@@ -2442,8 +2442,8 @@
         </p:nvSpPr>
         <p:spPr>
           <a:xfrm>
-            <a:off x="2258411" y="9722098"/>
-            <a:ext cx="6913245" cy="1457881"/>
+            <a:off x="2258414" y="9636370"/>
+            <a:ext cx="6913245" cy="1445026"/>
           </a:xfrm>
         </p:spPr>
         <p:txBody>
@@ -2512,7 +2512,7 @@
           <a:p>
             <a:fld id="{9C22C921-E2D9-4C60-A0F4-174E9EFE7024}" type="datetimeFigureOut">
               <a:rPr lang="fr-FR" smtClean="0"/>
-              <a:t>09/05/2017</a:t>
+              <a:t>30/06/2017</a:t>
             </a:fld>
             <a:endParaRPr lang="fr-FR"/>
           </a:p>
@@ -2607,8 +2607,8 @@
         </p:nvSpPr>
         <p:spPr>
           <a:xfrm>
-            <a:off x="576105" y="497462"/>
-            <a:ext cx="10369868" cy="2070366"/>
+            <a:off x="576105" y="493077"/>
+            <a:ext cx="10369868" cy="2052109"/>
           </a:xfrm>
           <a:prstGeom prst="rect">
             <a:avLst/>
@@ -2640,8 +2640,8 @@
         </p:nvSpPr>
         <p:spPr>
           <a:xfrm>
-            <a:off x="576105" y="2898521"/>
-            <a:ext cx="10369868" cy="8198069"/>
+            <a:off x="576105" y="2872963"/>
+            <a:ext cx="10369868" cy="8125779"/>
           </a:xfrm>
           <a:prstGeom prst="rect">
             <a:avLst/>
@@ -2702,8 +2702,8 @@
         </p:nvSpPr>
         <p:spPr>
           <a:xfrm>
-            <a:off x="576108" y="11513532"/>
-            <a:ext cx="2688484" cy="661367"/>
+            <a:off x="576108" y="11412007"/>
+            <a:ext cx="2688484" cy="655535"/>
           </a:xfrm>
           <a:prstGeom prst="rect">
             <a:avLst/>
@@ -2725,7 +2725,7 @@
           <a:p>
             <a:fld id="{9C22C921-E2D9-4C60-A0F4-174E9EFE7024}" type="datetimeFigureOut">
               <a:rPr lang="fr-FR" smtClean="0"/>
-              <a:t>09/05/2017</a:t>
+              <a:t>30/06/2017</a:t>
             </a:fld>
             <a:endParaRPr lang="fr-FR"/>
           </a:p>
@@ -2743,8 +2743,8 @@
         </p:nvSpPr>
         <p:spPr>
           <a:xfrm>
-            <a:off x="3936710" y="11513532"/>
-            <a:ext cx="3648658" cy="661367"/>
+            <a:off x="3936710" y="11412007"/>
+            <a:ext cx="3648658" cy="655535"/>
           </a:xfrm>
           <a:prstGeom prst="rect">
             <a:avLst/>
@@ -2780,8 +2780,8 @@
         </p:nvSpPr>
         <p:spPr>
           <a:xfrm>
-            <a:off x="8257491" y="11513532"/>
-            <a:ext cx="2688484" cy="661367"/>
+            <a:off x="8257491" y="11412007"/>
+            <a:ext cx="2688484" cy="655535"/>
           </a:xfrm>
           <a:prstGeom prst="rect">
             <a:avLst/>
@@ -3102,7 +3102,7 @@
       </p:grpSpPr>
       <p:pic>
         <p:nvPicPr>
-          <p:cNvPr id="49" name="Picture 9"/>
+          <p:cNvPr id="1029" name="Picture 5"/>
           <p:cNvPicPr>
             <a:picLocks noChangeAspect="1" noChangeArrowheads="1"/>
           </p:cNvPicPr>
@@ -3123,7 +3123,61 @@
         </p:blipFill>
         <p:spPr bwMode="auto">
           <a:xfrm>
-            <a:off x="-71611" y="154800"/>
+            <a:off x="230411" y="8896771"/>
+            <a:ext cx="3154362" cy="3524250"/>
+          </a:xfrm>
+          <a:prstGeom prst="rect">
+            <a:avLst/>
+          </a:prstGeom>
+          <a:noFill/>
+          <a:ln>
+            <a:noFill/>
+          </a:ln>
+          <a:extLst>
+            <a:ext uri="{909E8E84-426E-40DD-AFC4-6F175D3DCCD1}">
+              <a14:hiddenFill xmlns:a14="http://schemas.microsoft.com/office/drawing/2010/main">
+                <a:solidFill>
+                  <a:schemeClr val="accent1"/>
+                </a:solidFill>
+              </a14:hiddenFill>
+            </a:ext>
+            <a:ext uri="{91240B29-F687-4F45-9708-019B960494DF}">
+              <a14:hiddenLine xmlns:a14="http://schemas.microsoft.com/office/drawing/2010/main" w="9525">
+                <a:solidFill>
+                  <a:schemeClr val="tx1"/>
+                </a:solidFill>
+                <a:miter lim="800000"/>
+                <a:headEnd/>
+                <a:tailEnd/>
+              </a14:hiddenLine>
+            </a:ext>
+          </a:extLst>
+        </p:spPr>
+      </p:pic>
+      <p:pic>
+        <p:nvPicPr>
+          <p:cNvPr id="107" name="Picture 9"/>
+          <p:cNvPicPr>
+            <a:picLocks noChangeAspect="1" noChangeArrowheads="1"/>
+          </p:cNvPicPr>
+          <p:nvPr/>
+        </p:nvPicPr>
+        <p:blipFill>
+          <a:blip r:embed="rId3">
+            <a:extLst>
+              <a:ext uri="{28A0092B-C50C-407E-A947-70E740481C1C}">
+                <a14:useLocalDpi xmlns:a14="http://schemas.microsoft.com/office/drawing/2010/main" val="0"/>
+              </a:ext>
+            </a:extLst>
+          </a:blip>
+          <a:srcRect/>
+          <a:stretch>
+            <a:fillRect/>
+          </a:stretch>
+        </p:blipFill>
+        <p:spPr bwMode="auto">
+          <a:xfrm>
+            <a:off x="-71611" y="5929"/>
             <a:ext cx="3422650" cy="8755062"/>
           </a:xfrm>
           <a:prstGeom prst="rect">
@@ -3166,28 +3220,28 @@
       </p:pic>
       <p:grpSp>
         <p:nvGrpSpPr>
-          <p:cNvPr id="50" name="Groupe 49"/>
+          <p:cNvPr id="108" name="Groupe 107"/>
           <p:cNvGrpSpPr/>
           <p:nvPr/>
         </p:nvGrpSpPr>
         <p:grpSpPr>
           <a:xfrm>
-            <a:off x="3374258" y="-108247"/>
-            <a:ext cx="3600000" cy="6293073"/>
-            <a:chOff x="8803382" y="1592038"/>
-            <a:chExt cx="3600000" cy="6293073"/>
+            <a:off x="3374258" y="-125610"/>
+            <a:ext cx="3600000" cy="6161565"/>
+            <a:chOff x="8803382" y="1723546"/>
+            <a:chExt cx="3600000" cy="6161565"/>
           </a:xfrm>
         </p:grpSpPr>
         <p:pic>
           <p:nvPicPr>
-            <p:cNvPr id="51" name="Picture 19"/>
+            <p:cNvPr id="109" name="Picture 19"/>
             <p:cNvPicPr>
               <a:picLocks noChangeAspect="1" noChangeArrowheads="1"/>
             </p:cNvPicPr>
             <p:nvPr/>
           </p:nvPicPr>
           <p:blipFill>
-            <a:blip r:embed="rId3">
+            <a:blip r:embed="rId4">
               <a:extLst>
                 <a:ext uri="{28A0092B-C50C-407E-A947-70E740481C1C}">
                   <a14:useLocalDpi xmlns:a14="http://schemas.microsoft.com/office/drawing/2010/main" val="0"/>
@@ -3244,14 +3298,14 @@
         </p:pic>
         <p:sp>
           <p:nvSpPr>
-            <p:cNvPr id="52" name="ZoneTexte 51"/>
+            <p:cNvPr id="110" name="ZoneTexte 109"/>
             <p:cNvSpPr txBox="1"/>
             <p:nvPr/>
           </p:nvSpPr>
           <p:spPr>
             <a:xfrm>
-              <a:off x="9487062" y="1592038"/>
-              <a:ext cx="543739" cy="461665"/>
+              <a:off x="9134254" y="1723546"/>
+              <a:ext cx="526106" cy="461665"/>
             </a:xfrm>
             <a:prstGeom prst="rect">
               <a:avLst/>
@@ -3269,7 +3323,7 @@
                   <a:latin typeface="Times New Roman" pitchFamily="18" charset="0"/>
                   <a:cs typeface="Times New Roman" pitchFamily="18" charset="0"/>
                 </a:rPr>
-                <a:t>(d)</a:t>
+                <a:t>(e)</a:t>
               </a:r>
               <a:endParaRPr lang="fr-FR" sz="2400" dirty="0">
                 <a:latin typeface="Times New Roman" pitchFamily="18" charset="0"/>
@@ -3281,13 +3335,13 @@
       </p:grpSp>
       <p:grpSp>
         <p:nvGrpSpPr>
-          <p:cNvPr id="53" name="Groupe 52"/>
+          <p:cNvPr id="111" name="Groupe 110"/>
           <p:cNvGrpSpPr/>
           <p:nvPr/>
         </p:nvGrpSpPr>
         <p:grpSpPr>
           <a:xfrm>
-            <a:off x="3224795" y="6534968"/>
+            <a:off x="3224795" y="6420569"/>
             <a:ext cx="3786149" cy="5904656"/>
             <a:chOff x="4014217" y="5617021"/>
             <a:chExt cx="3786149" cy="5904656"/>
@@ -3295,14 +3349,14 @@
         </p:grpSpPr>
         <p:pic>
           <p:nvPicPr>
-            <p:cNvPr id="54" name="Picture 14"/>
+            <p:cNvPr id="112" name="Picture 14"/>
             <p:cNvPicPr>
               <a:picLocks noChangeAspect="1" noChangeArrowheads="1"/>
             </p:cNvPicPr>
             <p:nvPr/>
           </p:nvPicPr>
           <p:blipFill rotWithShape="1">
-            <a:blip r:embed="rId4">
+            <a:blip r:embed="rId5">
               <a:extLst>
                 <a:ext uri="{28A0092B-C50C-407E-A947-70E740481C1C}">
                   <a14:useLocalDpi xmlns:a14="http://schemas.microsoft.com/office/drawing/2010/main" val="0"/>
@@ -3357,14 +3411,14 @@
         </p:pic>
         <p:sp>
           <p:nvSpPr>
-            <p:cNvPr id="55" name="ZoneTexte 54"/>
+            <p:cNvPr id="113" name="ZoneTexte 112"/>
             <p:cNvSpPr txBox="1"/>
             <p:nvPr/>
           </p:nvSpPr>
           <p:spPr>
             <a:xfrm>
               <a:off x="4844669" y="5617021"/>
-              <a:ext cx="543739" cy="461665"/>
+              <a:ext cx="526106" cy="461665"/>
             </a:xfrm>
             <a:prstGeom prst="rect">
               <a:avLst/>
@@ -3382,7 +3436,7 @@
                   <a:latin typeface="Times New Roman" pitchFamily="18" charset="0"/>
                   <a:cs typeface="Times New Roman" pitchFamily="18" charset="0"/>
                 </a:rPr>
-                <a:t>(b)</a:t>
+                <a:t>(c)</a:t>
               </a:r>
               <a:endParaRPr lang="fr-FR" sz="2400" dirty="0">
                 <a:latin typeface="Times New Roman" pitchFamily="18" charset="0"/>
@@ -3394,13 +3448,13 @@
       </p:grpSp>
       <p:sp>
         <p:nvSpPr>
-          <p:cNvPr id="56" name="ZoneTexte 55"/>
+          <p:cNvPr id="114" name="ZoneTexte 113"/>
           <p:cNvSpPr txBox="1"/>
           <p:nvPr/>
         </p:nvSpPr>
         <p:spPr>
           <a:xfrm>
-            <a:off x="736588" y="-119385"/>
+            <a:off x="288429" y="-125610"/>
             <a:ext cx="526106" cy="461665"/>
           </a:xfrm>
           <a:prstGeom prst="rect">
@@ -3430,13 +3484,13 @@
       </p:sp>
       <p:sp>
         <p:nvSpPr>
-          <p:cNvPr id="57" name="Rectangle 56"/>
+          <p:cNvPr id="115" name="Rectangle 114"/>
           <p:cNvSpPr/>
           <p:nvPr/>
         </p:nvSpPr>
         <p:spPr>
           <a:xfrm>
-            <a:off x="1620000" y="8244000"/>
+            <a:off x="1620000" y="8095129"/>
             <a:ext cx="261913" cy="144016"/>
           </a:xfrm>
           <a:prstGeom prst="rect">
@@ -3472,14 +3526,14 @@
       </p:sp>
       <p:sp>
         <p:nvSpPr>
-          <p:cNvPr id="58" name="Rectangle 57"/>
+          <p:cNvPr id="116" name="Rectangle 115"/>
           <p:cNvSpPr/>
           <p:nvPr/>
         </p:nvSpPr>
         <p:spPr>
           <a:xfrm>
-            <a:off x="828000" y="5284888"/>
-            <a:ext cx="2106000" cy="2304255"/>
+            <a:off x="828000" y="4909933"/>
+            <a:ext cx="2106000" cy="2530339"/>
           </a:xfrm>
           <a:prstGeom prst="rect">
             <a:avLst/>
@@ -3514,14 +3568,14 @@
       </p:sp>
       <p:cxnSp>
         <p:nvCxnSpPr>
-          <p:cNvPr id="59" name="Connecteur droit 58"/>
+          <p:cNvPr id="117" name="Connecteur droit 116"/>
           <p:cNvCxnSpPr/>
           <p:nvPr/>
         </p:nvCxnSpPr>
         <p:spPr>
           <a:xfrm flipH="1" flipV="1">
-            <a:off x="1881913" y="8388017"/>
-            <a:ext cx="2294948" cy="3475543"/>
+            <a:off x="1881000" y="8239145"/>
+            <a:ext cx="2295861" cy="3510017"/>
           </a:xfrm>
           <a:prstGeom prst="line">
             <a:avLst/>
@@ -3544,13 +3598,13 @@
       </p:cxnSp>
       <p:grpSp>
         <p:nvGrpSpPr>
-          <p:cNvPr id="60" name="Groupe 59"/>
+          <p:cNvPr id="118" name="Groupe 117"/>
           <p:cNvGrpSpPr/>
           <p:nvPr/>
         </p:nvGrpSpPr>
         <p:grpSpPr>
           <a:xfrm>
-            <a:off x="6650904" y="1547937"/>
+            <a:off x="6650904" y="1399066"/>
             <a:ext cx="5230813" cy="3562556"/>
             <a:chOff x="7496372" y="1148916"/>
             <a:chExt cx="5230813" cy="3562556"/>
@@ -3558,14 +3612,14 @@
         </p:grpSpPr>
         <p:pic>
           <p:nvPicPr>
-            <p:cNvPr id="61" name="Picture 18"/>
+            <p:cNvPr id="119" name="Picture 18"/>
             <p:cNvPicPr>
               <a:picLocks noChangeAspect="1" noChangeArrowheads="1"/>
             </p:cNvPicPr>
             <p:nvPr/>
           </p:nvPicPr>
           <p:blipFill>
-            <a:blip r:embed="rId5">
+            <a:blip r:embed="rId6">
               <a:extLst>
                 <a:ext uri="{28A0092B-C50C-407E-A947-70E740481C1C}">
                   <a14:useLocalDpi xmlns:a14="http://schemas.microsoft.com/office/drawing/2010/main" val="0"/>
@@ -3622,14 +3676,14 @@
         </p:pic>
         <p:sp>
           <p:nvSpPr>
-            <p:cNvPr id="62" name="ZoneTexte 61"/>
+            <p:cNvPr id="120" name="ZoneTexte 119"/>
             <p:cNvSpPr txBox="1"/>
             <p:nvPr/>
           </p:nvSpPr>
           <p:spPr>
             <a:xfrm>
               <a:off x="8396782" y="1148916"/>
-              <a:ext cx="526106" cy="461665"/>
+              <a:ext cx="492443" cy="461665"/>
             </a:xfrm>
             <a:prstGeom prst="rect">
               <a:avLst/>
@@ -3647,7 +3701,7 @@
                   <a:latin typeface="Times New Roman" pitchFamily="18" charset="0"/>
                   <a:cs typeface="Times New Roman" pitchFamily="18" charset="0"/>
                 </a:rPr>
-                <a:t>(e)</a:t>
+                <a:t>(f)</a:t>
               </a:r>
               <a:endParaRPr lang="fr-FR" sz="2400" dirty="0">
                 <a:latin typeface="Times New Roman" pitchFamily="18" charset="0"/>
@@ -3659,13 +3713,13 @@
       </p:grpSp>
       <p:cxnSp>
         <p:nvCxnSpPr>
-          <p:cNvPr id="63" name="Connecteur droit 62"/>
+          <p:cNvPr id="121" name="Connecteur droit 120"/>
           <p:cNvCxnSpPr/>
           <p:nvPr/>
         </p:nvCxnSpPr>
         <p:spPr>
           <a:xfrm flipV="1">
-            <a:off x="2934000" y="5670872"/>
+            <a:off x="2934000" y="5522001"/>
             <a:ext cx="1242861" cy="1918272"/>
           </a:xfrm>
           <a:prstGeom prst="line">
@@ -3689,14 +3743,14 @@
       </p:cxnSp>
       <p:cxnSp>
         <p:nvCxnSpPr>
-          <p:cNvPr id="64" name="Connecteur droit 63"/>
+          <p:cNvPr id="122" name="Connecteur droit 121"/>
           <p:cNvCxnSpPr/>
           <p:nvPr/>
         </p:nvCxnSpPr>
         <p:spPr>
           <a:xfrm flipV="1">
-            <a:off x="2934000" y="381542"/>
-            <a:ext cx="1242861" cy="4903346"/>
+            <a:off x="2934000" y="232671"/>
+            <a:ext cx="1242861" cy="4677262"/>
           </a:xfrm>
           <a:prstGeom prst="line">
             <a:avLst/>
@@ -3719,14 +3773,14 @@
       </p:cxnSp>
       <p:cxnSp>
         <p:nvCxnSpPr>
-          <p:cNvPr id="65" name="Connecteur droit 64"/>
+          <p:cNvPr id="123" name="Connecteur droit 122"/>
           <p:cNvCxnSpPr/>
           <p:nvPr/>
         </p:nvCxnSpPr>
         <p:spPr>
           <a:xfrm flipV="1">
-            <a:off x="1881913" y="6996633"/>
-            <a:ext cx="2294948" cy="1247367"/>
+            <a:off x="1881913" y="6925995"/>
+            <a:ext cx="2294948" cy="1169135"/>
           </a:xfrm>
           <a:prstGeom prst="line">
             <a:avLst/>
@@ -3749,13 +3803,13 @@
       </p:cxnSp>
       <p:grpSp>
         <p:nvGrpSpPr>
-          <p:cNvPr id="66" name="Groupe 65"/>
+          <p:cNvPr id="124" name="Groupe 123"/>
           <p:cNvGrpSpPr/>
           <p:nvPr/>
         </p:nvGrpSpPr>
         <p:grpSpPr>
           <a:xfrm>
-            <a:off x="7180873" y="7471072"/>
+            <a:off x="7180873" y="7356673"/>
             <a:ext cx="3826825" cy="4136605"/>
             <a:chOff x="8083053" y="6625133"/>
             <a:chExt cx="3826825" cy="4136605"/>
@@ -3763,14 +3817,14 @@
         </p:grpSpPr>
         <p:pic>
           <p:nvPicPr>
-            <p:cNvPr id="67" name="Picture 16"/>
+            <p:cNvPr id="125" name="Picture 16"/>
             <p:cNvPicPr>
               <a:picLocks noChangeAspect="1" noChangeArrowheads="1"/>
             </p:cNvPicPr>
             <p:nvPr/>
           </p:nvPicPr>
           <p:blipFill rotWithShape="1">
-            <a:blip r:embed="rId6">
+            <a:blip r:embed="rId7">
               <a:extLst>
                 <a:ext uri="{28A0092B-C50C-407E-A947-70E740481C1C}">
                   <a14:useLocalDpi xmlns:a14="http://schemas.microsoft.com/office/drawing/2010/main" val="0"/>
@@ -3825,14 +3879,14 @@
         </p:pic>
         <p:sp>
           <p:nvSpPr>
-            <p:cNvPr id="68" name="ZoneTexte 67"/>
+            <p:cNvPr id="126" name="ZoneTexte 125"/>
             <p:cNvSpPr txBox="1"/>
             <p:nvPr/>
           </p:nvSpPr>
           <p:spPr>
             <a:xfrm>
               <a:off x="8479407" y="6625133"/>
-              <a:ext cx="526106" cy="461665"/>
+              <a:ext cx="543739" cy="461665"/>
             </a:xfrm>
             <a:prstGeom prst="rect">
               <a:avLst/>
@@ -3850,7 +3904,7 @@
                   <a:latin typeface="Times New Roman" pitchFamily="18" charset="0"/>
                   <a:cs typeface="Times New Roman" pitchFamily="18" charset="0"/>
                 </a:rPr>
-                <a:t>(c)</a:t>
+                <a:t>(d)</a:t>
               </a:r>
               <a:endParaRPr lang="fr-FR" sz="2400" dirty="0">
                 <a:latin typeface="Times New Roman" pitchFamily="18" charset="0"/>
@@ -3862,13 +3916,13 @@
       </p:grpSp>
       <p:sp>
         <p:nvSpPr>
-          <p:cNvPr id="69" name="Rectangle 68"/>
+          <p:cNvPr id="127" name="Rectangle 126"/>
           <p:cNvSpPr/>
           <p:nvPr/>
         </p:nvSpPr>
         <p:spPr>
           <a:xfrm>
-            <a:off x="4882315" y="4878784"/>
+            <a:off x="4882315" y="4729913"/>
             <a:ext cx="1553036" cy="360040"/>
           </a:xfrm>
           <a:prstGeom prst="rect">
@@ -3904,13 +3958,13 @@
       </p:sp>
       <p:cxnSp>
         <p:nvCxnSpPr>
-          <p:cNvPr id="70" name="Connecteur droit 69"/>
+          <p:cNvPr id="128" name="Connecteur droit 127"/>
           <p:cNvCxnSpPr/>
           <p:nvPr/>
         </p:nvCxnSpPr>
         <p:spPr>
           <a:xfrm flipV="1">
-            <a:off x="6435351" y="2009602"/>
+            <a:off x="6435351" y="1860731"/>
             <a:ext cx="1296144" cy="2869182"/>
           </a:xfrm>
           <a:prstGeom prst="line">
@@ -3934,13 +3988,13 @@
       </p:cxnSp>
       <p:cxnSp>
         <p:nvCxnSpPr>
-          <p:cNvPr id="71" name="Connecteur droit 70"/>
+          <p:cNvPr id="129" name="Connecteur droit 128"/>
           <p:cNvCxnSpPr/>
           <p:nvPr/>
         </p:nvCxnSpPr>
         <p:spPr>
           <a:xfrm flipV="1">
-            <a:off x="6435351" y="4446736"/>
+            <a:off x="6435351" y="4297865"/>
             <a:ext cx="1296144" cy="792088"/>
           </a:xfrm>
           <a:prstGeom prst="line">
@@ -3962,6 +4016,42 @@
           </a:fontRef>
         </p:style>
       </p:cxnSp>
+      <p:sp>
+        <p:nvSpPr>
+          <p:cNvPr id="130" name="ZoneTexte 129"/>
+          <p:cNvSpPr txBox="1"/>
+          <p:nvPr/>
+        </p:nvSpPr>
+        <p:spPr>
+          <a:xfrm>
+            <a:off x="288429" y="8820621"/>
+            <a:ext cx="543739" cy="461665"/>
+          </a:xfrm>
+          <a:prstGeom prst="rect">
+            <a:avLst/>
+          </a:prstGeom>
+          <a:noFill/>
+        </p:spPr>
+        <p:txBody>
+          <a:bodyPr wrap="none" rtlCol="0">
+            <a:spAutoFit/>
+          </a:bodyPr>
+          <a:lstStyle/>
+          <a:p>
+            <a:r>
+              <a:rPr lang="fr-FR" sz="2400" dirty="0" smtClean="0">
+                <a:latin typeface="Times New Roman" pitchFamily="18" charset="0"/>
+                <a:cs typeface="Times New Roman" pitchFamily="18" charset="0"/>
+              </a:rPr>
+              <a:t>(b)</a:t>
+            </a:r>
+            <a:endParaRPr lang="fr-FR" sz="2400" dirty="0">
+              <a:latin typeface="Times New Roman" pitchFamily="18" charset="0"/>
+              <a:cs typeface="Times New Roman" pitchFamily="18" charset="0"/>
+            </a:endParaRPr>
+          </a:p>
+        </p:txBody>
+      </p:sp>
     </p:spTree>
     <p:extLst>
       <p:ext uri="{BB962C8B-B14F-4D97-AF65-F5344CB8AC3E}">

</xml_diff>